<commit_message>
Minor changes and fixes
</commit_message>
<xml_diff>
--- a/images/agglomerative.pptx
+++ b/images/agglomerative.pptx
@@ -105,6 +105,11 @@
       </a:defRPr>
     </a:lvl9pPr>
   </p:defaultTextStyle>
+  <p:extLst>
+    <p:ext uri="{EFAFB233-063F-42B5-8137-9DF3F51BA10A}">
+      <p15:sldGuideLst xmlns:p15="http://schemas.microsoft.com/office/powerpoint/2012/main"/>
+    </p:ext>
+  </p:extLst>
 </p:presentation>
 </file>
 
@@ -255,7 +260,7 @@
           <a:p>
             <a:fld id="{4F9C8474-DA4B-4C3A-AB7D-294F4DB0EE8C}" type="datetimeFigureOut">
               <a:rPr lang="el-GR" smtClean="0"/>
-              <a:t>17/2/2020</a:t>
+              <a:t>23/2/2020</a:t>
             </a:fld>
             <a:endParaRPr lang="el-GR"/>
           </a:p>
@@ -453,7 +458,7 @@
           <a:p>
             <a:fld id="{4F9C8474-DA4B-4C3A-AB7D-294F4DB0EE8C}" type="datetimeFigureOut">
               <a:rPr lang="el-GR" smtClean="0"/>
-              <a:t>17/2/2020</a:t>
+              <a:t>23/2/2020</a:t>
             </a:fld>
             <a:endParaRPr lang="el-GR"/>
           </a:p>
@@ -661,7 +666,7 @@
           <a:p>
             <a:fld id="{4F9C8474-DA4B-4C3A-AB7D-294F4DB0EE8C}" type="datetimeFigureOut">
               <a:rPr lang="el-GR" smtClean="0"/>
-              <a:t>17/2/2020</a:t>
+              <a:t>23/2/2020</a:t>
             </a:fld>
             <a:endParaRPr lang="el-GR"/>
           </a:p>
@@ -859,7 +864,7 @@
           <a:p>
             <a:fld id="{4F9C8474-DA4B-4C3A-AB7D-294F4DB0EE8C}" type="datetimeFigureOut">
               <a:rPr lang="el-GR" smtClean="0"/>
-              <a:t>17/2/2020</a:t>
+              <a:t>23/2/2020</a:t>
             </a:fld>
             <a:endParaRPr lang="el-GR"/>
           </a:p>
@@ -1134,7 +1139,7 @@
           <a:p>
             <a:fld id="{4F9C8474-DA4B-4C3A-AB7D-294F4DB0EE8C}" type="datetimeFigureOut">
               <a:rPr lang="el-GR" smtClean="0"/>
-              <a:t>17/2/2020</a:t>
+              <a:t>23/2/2020</a:t>
             </a:fld>
             <a:endParaRPr lang="el-GR"/>
           </a:p>
@@ -1399,7 +1404,7 @@
           <a:p>
             <a:fld id="{4F9C8474-DA4B-4C3A-AB7D-294F4DB0EE8C}" type="datetimeFigureOut">
               <a:rPr lang="el-GR" smtClean="0"/>
-              <a:t>17/2/2020</a:t>
+              <a:t>23/2/2020</a:t>
             </a:fld>
             <a:endParaRPr lang="el-GR"/>
           </a:p>
@@ -1811,7 +1816,7 @@
           <a:p>
             <a:fld id="{4F9C8474-DA4B-4C3A-AB7D-294F4DB0EE8C}" type="datetimeFigureOut">
               <a:rPr lang="el-GR" smtClean="0"/>
-              <a:t>17/2/2020</a:t>
+              <a:t>23/2/2020</a:t>
             </a:fld>
             <a:endParaRPr lang="el-GR"/>
           </a:p>
@@ -1952,7 +1957,7 @@
           <a:p>
             <a:fld id="{4F9C8474-DA4B-4C3A-AB7D-294F4DB0EE8C}" type="datetimeFigureOut">
               <a:rPr lang="el-GR" smtClean="0"/>
-              <a:t>17/2/2020</a:t>
+              <a:t>23/2/2020</a:t>
             </a:fld>
             <a:endParaRPr lang="el-GR"/>
           </a:p>
@@ -2065,7 +2070,7 @@
           <a:p>
             <a:fld id="{4F9C8474-DA4B-4C3A-AB7D-294F4DB0EE8C}" type="datetimeFigureOut">
               <a:rPr lang="el-GR" smtClean="0"/>
-              <a:t>17/2/2020</a:t>
+              <a:t>23/2/2020</a:t>
             </a:fld>
             <a:endParaRPr lang="el-GR"/>
           </a:p>
@@ -2376,7 +2381,7 @@
           <a:p>
             <a:fld id="{4F9C8474-DA4B-4C3A-AB7D-294F4DB0EE8C}" type="datetimeFigureOut">
               <a:rPr lang="el-GR" smtClean="0"/>
-              <a:t>17/2/2020</a:t>
+              <a:t>23/2/2020</a:t>
             </a:fld>
             <a:endParaRPr lang="el-GR"/>
           </a:p>
@@ -2664,7 +2669,7 @@
           <a:p>
             <a:fld id="{4F9C8474-DA4B-4C3A-AB7D-294F4DB0EE8C}" type="datetimeFigureOut">
               <a:rPr lang="el-GR" smtClean="0"/>
-              <a:t>17/2/2020</a:t>
+              <a:t>23/2/2020</a:t>
             </a:fld>
             <a:endParaRPr lang="el-GR"/>
           </a:p>
@@ -2905,7 +2910,7 @@
           <a:p>
             <a:fld id="{4F9C8474-DA4B-4C3A-AB7D-294F4DB0EE8C}" type="datetimeFigureOut">
               <a:rPr lang="el-GR" smtClean="0"/>
-              <a:t>17/2/2020</a:t>
+              <a:t>23/2/2020</a:t>
             </a:fld>
             <a:endParaRPr lang="el-GR"/>
           </a:p>
@@ -3322,62 +3327,12 @@
           <a:chExt cx="0" cy="0"/>
         </a:xfrm>
       </p:grpSpPr>
-      <p:sp>
-        <p:nvSpPr>
-          <p:cNvPr id="2" name="Τίτλος 1">
-            <a:extLst>
-              <a:ext uri="{FF2B5EF4-FFF2-40B4-BE49-F238E27FC236}">
-                <a16:creationId xmlns:a16="http://schemas.microsoft.com/office/drawing/2014/main" id="{A3488236-A82D-4D01-9B45-FDC6A780D218}"/>
-              </a:ext>
-            </a:extLst>
-          </p:cNvPr>
-          <p:cNvSpPr>
-            <a:spLocks noGrp="1"/>
-          </p:cNvSpPr>
-          <p:nvPr>
-            <p:ph type="ctrTitle"/>
-          </p:nvPr>
-        </p:nvSpPr>
-        <p:spPr/>
-        <p:txBody>
-          <a:bodyPr/>
-          <a:lstStyle/>
-          <a:p>
-            <a:endParaRPr lang="el-GR"/>
-          </a:p>
-        </p:txBody>
-      </p:sp>
-      <p:sp>
-        <p:nvSpPr>
-          <p:cNvPr id="3" name="Υπότιτλος 2">
-            <a:extLst>
-              <a:ext uri="{FF2B5EF4-FFF2-40B4-BE49-F238E27FC236}">
-                <a16:creationId xmlns:a16="http://schemas.microsoft.com/office/drawing/2014/main" id="{FDFFA9BC-17BE-412C-BCF6-7F8A7AC74B7C}"/>
-              </a:ext>
-            </a:extLst>
-          </p:cNvPr>
-          <p:cNvSpPr>
-            <a:spLocks noGrp="1"/>
-          </p:cNvSpPr>
-          <p:nvPr>
-            <p:ph type="subTitle" idx="1"/>
-          </p:nvPr>
-        </p:nvSpPr>
-        <p:spPr/>
-        <p:txBody>
-          <a:bodyPr/>
-          <a:lstStyle/>
-          <a:p>
-            <a:endParaRPr lang="el-GR"/>
-          </a:p>
-        </p:txBody>
-      </p:sp>
       <p:pic>
         <p:nvPicPr>
-          <p:cNvPr id="5" name="Εικόνα 4">
-            <a:extLst>
-              <a:ext uri="{FF2B5EF4-FFF2-40B4-BE49-F238E27FC236}">
-                <a16:creationId xmlns:a16="http://schemas.microsoft.com/office/drawing/2014/main" id="{2E43033C-3798-41FB-9E2E-C2FA7963E16D}"/>
+          <p:cNvPr id="6" name="Εικόνα 5">
+            <a:extLst>
+              <a:ext uri="{FF2B5EF4-FFF2-40B4-BE49-F238E27FC236}">
+                <a16:creationId xmlns:a16="http://schemas.microsoft.com/office/drawing/2014/main" id="{E0D9C521-4402-42A8-816C-09D1C8DFC74C}"/>
               </a:ext>
             </a:extLst>
           </p:cNvPr>
@@ -3388,13 +3343,13 @@
         </p:nvPicPr>
         <p:blipFill rotWithShape="1">
           <a:blip r:embed="rId2"/>
-          <a:srcRect l="3112" t="23600" r="25798" b="11489"/>
+          <a:srcRect l="2952" t="23829" r="25878" b="11348"/>
           <a:stretch/>
         </p:blipFill>
         <p:spPr>
           <a:xfrm>
-            <a:off x="0" y="304488"/>
-            <a:ext cx="12166991" cy="6249023"/>
+            <a:off x="0" y="307637"/>
+            <a:ext cx="12184926" cy="6242726"/>
           </a:xfrm>
           <a:prstGeom prst="rect">
             <a:avLst/>
@@ -3458,10 +3413,10 @@
       </p:sp>
       <p:pic>
         <p:nvPicPr>
-          <p:cNvPr id="4" name="Εικόνα 3">
-            <a:extLst>
-              <a:ext uri="{FF2B5EF4-FFF2-40B4-BE49-F238E27FC236}">
-                <a16:creationId xmlns:a16="http://schemas.microsoft.com/office/drawing/2014/main" id="{7FB931D9-14F5-429D-8921-091050703933}"/>
+          <p:cNvPr id="2" name="Εικόνα 1">
+            <a:extLst>
+              <a:ext uri="{FF2B5EF4-FFF2-40B4-BE49-F238E27FC236}">
+                <a16:creationId xmlns:a16="http://schemas.microsoft.com/office/drawing/2014/main" id="{0018B477-05A4-4BAB-AE3D-E5BE23CA6377}"/>
               </a:ext>
             </a:extLst>
           </p:cNvPr>
@@ -3472,13 +3427,13 @@
         </p:nvPicPr>
         <p:blipFill rotWithShape="1">
           <a:blip r:embed="rId2"/>
-          <a:srcRect l="3127" t="21986" r="26148" b="11489"/>
+          <a:srcRect l="3271" t="23688" r="25798" b="11489"/>
           <a:stretch/>
         </p:blipFill>
         <p:spPr>
           <a:xfrm>
-            <a:off x="0" y="203640"/>
-            <a:ext cx="12192000" cy="6450719"/>
+            <a:off x="0" y="295285"/>
+            <a:ext cx="12192000" cy="6267429"/>
           </a:xfrm>
           <a:prstGeom prst="rect">
             <a:avLst/>

</xml_diff>